<commit_message>
Updates to Introduction to Test-Driven Development
</commit_message>
<xml_diff>
--- a/presentations/Introduction to Test-Driven Development.pptx
+++ b/presentations/Introduction to Test-Driven Development.pptx
@@ -13,14 +13,14 @@
     <p:sldId id="260" r:id="rId4"/>
     <p:sldId id="267" r:id="rId5"/>
     <p:sldId id="275" r:id="rId6"/>
-    <p:sldId id="286" r:id="rId7"/>
-    <p:sldId id="284" r:id="rId8"/>
-    <p:sldId id="273" r:id="rId9"/>
-    <p:sldId id="276" r:id="rId10"/>
-    <p:sldId id="274" r:id="rId11"/>
-    <p:sldId id="271" r:id="rId12"/>
-    <p:sldId id="272" r:id="rId13"/>
-    <p:sldId id="258" r:id="rId14"/>
+    <p:sldId id="258" r:id="rId7"/>
+    <p:sldId id="286" r:id="rId8"/>
+    <p:sldId id="284" r:id="rId9"/>
+    <p:sldId id="273" r:id="rId10"/>
+    <p:sldId id="276" r:id="rId11"/>
+    <p:sldId id="274" r:id="rId12"/>
+    <p:sldId id="271" r:id="rId13"/>
+    <p:sldId id="272" r:id="rId14"/>
     <p:sldId id="259" r:id="rId15"/>
     <p:sldId id="278" r:id="rId16"/>
     <p:sldId id="279" r:id="rId17"/>
@@ -215,7 +215,7 @@
           <a:p>
             <a:fld id="{F26B28AA-01EF-FC4E-9902-F717EB4A0D20}" type="datetimeFigureOut">
               <a:rPr lang="en-US" smtClean="0"/>
-              <a:t>7/27/21</a:t>
+              <a:t>10/27/21</a:t>
             </a:fld>
             <a:endParaRPr lang="en-US"/>
           </a:p>
@@ -713,7 +713,7 @@
           <a:p>
             <a:fld id="{BCD77189-38F1-1B47-A134-7F70D5119BAA}" type="datetimeFigureOut">
               <a:rPr lang="en-US" smtClean="0"/>
-              <a:t>7/26/21</a:t>
+              <a:t>10/27/21</a:t>
             </a:fld>
             <a:endParaRPr lang="en-US"/>
           </a:p>
@@ -911,7 +911,7 @@
           <a:p>
             <a:fld id="{BCD77189-38F1-1B47-A134-7F70D5119BAA}" type="datetimeFigureOut">
               <a:rPr lang="en-US" smtClean="0"/>
-              <a:t>7/26/21</a:t>
+              <a:t>10/27/21</a:t>
             </a:fld>
             <a:endParaRPr lang="en-US"/>
           </a:p>
@@ -1119,7 +1119,7 @@
           <a:p>
             <a:fld id="{BCD77189-38F1-1B47-A134-7F70D5119BAA}" type="datetimeFigureOut">
               <a:rPr lang="en-US" smtClean="0"/>
-              <a:t>7/26/21</a:t>
+              <a:t>10/27/21</a:t>
             </a:fld>
             <a:endParaRPr lang="en-US"/>
           </a:p>
@@ -1317,7 +1317,7 @@
           <a:p>
             <a:fld id="{BCD77189-38F1-1B47-A134-7F70D5119BAA}" type="datetimeFigureOut">
               <a:rPr lang="en-US" smtClean="0"/>
-              <a:t>7/26/21</a:t>
+              <a:t>10/27/21</a:t>
             </a:fld>
             <a:endParaRPr lang="en-US"/>
           </a:p>
@@ -1592,7 +1592,7 @@
           <a:p>
             <a:fld id="{BCD77189-38F1-1B47-A134-7F70D5119BAA}" type="datetimeFigureOut">
               <a:rPr lang="en-US" smtClean="0"/>
-              <a:t>7/26/21</a:t>
+              <a:t>10/27/21</a:t>
             </a:fld>
             <a:endParaRPr lang="en-US"/>
           </a:p>
@@ -1857,7 +1857,7 @@
           <a:p>
             <a:fld id="{BCD77189-38F1-1B47-A134-7F70D5119BAA}" type="datetimeFigureOut">
               <a:rPr lang="en-US" smtClean="0"/>
-              <a:t>7/26/21</a:t>
+              <a:t>10/27/21</a:t>
             </a:fld>
             <a:endParaRPr lang="en-US"/>
           </a:p>
@@ -2269,7 +2269,7 @@
           <a:p>
             <a:fld id="{BCD77189-38F1-1B47-A134-7F70D5119BAA}" type="datetimeFigureOut">
               <a:rPr lang="en-US" smtClean="0"/>
-              <a:t>7/26/21</a:t>
+              <a:t>10/27/21</a:t>
             </a:fld>
             <a:endParaRPr lang="en-US"/>
           </a:p>
@@ -2410,7 +2410,7 @@
           <a:p>
             <a:fld id="{BCD77189-38F1-1B47-A134-7F70D5119BAA}" type="datetimeFigureOut">
               <a:rPr lang="en-US" smtClean="0"/>
-              <a:t>7/26/21</a:t>
+              <a:t>10/27/21</a:t>
             </a:fld>
             <a:endParaRPr lang="en-US"/>
           </a:p>
@@ -2523,7 +2523,7 @@
           <a:p>
             <a:fld id="{BCD77189-38F1-1B47-A134-7F70D5119BAA}" type="datetimeFigureOut">
               <a:rPr lang="en-US" smtClean="0"/>
-              <a:t>7/26/21</a:t>
+              <a:t>10/27/21</a:t>
             </a:fld>
             <a:endParaRPr lang="en-US"/>
           </a:p>
@@ -2834,7 +2834,7 @@
           <a:p>
             <a:fld id="{BCD77189-38F1-1B47-A134-7F70D5119BAA}" type="datetimeFigureOut">
               <a:rPr lang="en-US" smtClean="0"/>
-              <a:t>7/26/21</a:t>
+              <a:t>10/27/21</a:t>
             </a:fld>
             <a:endParaRPr lang="en-US"/>
           </a:p>
@@ -3122,7 +3122,7 @@
           <a:p>
             <a:fld id="{BCD77189-38F1-1B47-A134-7F70D5119BAA}" type="datetimeFigureOut">
               <a:rPr lang="en-US" smtClean="0"/>
-              <a:t>7/26/21</a:t>
+              <a:t>10/27/21</a:t>
             </a:fld>
             <a:endParaRPr lang="en-US"/>
           </a:p>
@@ -3363,7 +3363,7 @@
           <a:p>
             <a:fld id="{BCD77189-38F1-1B47-A134-7F70D5119BAA}" type="datetimeFigureOut">
               <a:rPr lang="en-US" smtClean="0"/>
-              <a:t>7/26/21</a:t>
+              <a:t>10/27/21</a:t>
             </a:fld>
             <a:endParaRPr lang="en-US"/>
           </a:p>
@@ -3863,13 +3863,13 @@
   <p:clrMapOvr>
     <a:masterClrMapping/>
   </p:clrMapOvr>
-  <mc:AlternateContent xmlns:mc="http://schemas.openxmlformats.org/markup-compatibility/2006">
-    <mc:Choice xmlns:p14="http://schemas.microsoft.com/office/powerpoint/2010/main" Requires="p14">
+  <mc:AlternateContent xmlns:mc="http://schemas.openxmlformats.org/markup-compatibility/2006" xmlns:p14="http://schemas.microsoft.com/office/powerpoint/2010/main">
+    <mc:Choice Requires="p14">
       <p:transition spd="med" p14:dur="700">
         <p:fade/>
       </p:transition>
     </mc:Choice>
-    <mc:Fallback>
+    <mc:Fallback xmlns="">
       <p:transition spd="med">
         <p:fade/>
       </p:transition>
@@ -3879,6 +3879,353 @@
 </file>
 
 <file path=ppt/slides/slide10.xml><?xml version="1.0" encoding="utf-8"?>
+<p:sld xmlns:a="http://schemas.openxmlformats.org/drawingml/2006/main" xmlns:r="http://schemas.openxmlformats.org/officeDocument/2006/relationships" xmlns:p="http://schemas.openxmlformats.org/presentationml/2006/main">
+  <p:cSld>
+    <p:spTree>
+      <p:nvGrpSpPr>
+        <p:cNvPr id="1" name=""/>
+        <p:cNvGrpSpPr/>
+        <p:nvPr/>
+      </p:nvGrpSpPr>
+      <p:grpSpPr>
+        <a:xfrm>
+          <a:off x="0" y="0"/>
+          <a:ext cx="0" cy="0"/>
+          <a:chOff x="0" y="0"/>
+          <a:chExt cx="0" cy="0"/>
+        </a:xfrm>
+      </p:grpSpPr>
+      <p:sp>
+        <p:nvSpPr>
+          <p:cNvPr id="2" name="Title 1">
+            <a:extLst>
+              <a:ext uri="{FF2B5EF4-FFF2-40B4-BE49-F238E27FC236}">
+                <a16:creationId xmlns:a16="http://schemas.microsoft.com/office/drawing/2014/main" id="{B557B37C-020B-E749-B234-CB1BC31B0CD1}"/>
+              </a:ext>
+            </a:extLst>
+          </p:cNvPr>
+          <p:cNvSpPr>
+            <a:spLocks noGrp="1"/>
+          </p:cNvSpPr>
+          <p:nvPr>
+            <p:ph type="title"/>
+          </p:nvPr>
+        </p:nvSpPr>
+        <p:spPr/>
+        <p:txBody>
+          <a:bodyPr/>
+          <a:lstStyle/>
+          <a:p>
+            <a:r>
+              <a:rPr lang="en-US" b="1" dirty="0"/>
+              <a:t>Accidental vs. essential complexity</a:t>
+            </a:r>
+          </a:p>
+        </p:txBody>
+      </p:sp>
+      <p:sp>
+        <p:nvSpPr>
+          <p:cNvPr id="3" name="Content Placeholder 2">
+            <a:extLst>
+              <a:ext uri="{FF2B5EF4-FFF2-40B4-BE49-F238E27FC236}">
+                <a16:creationId xmlns:a16="http://schemas.microsoft.com/office/drawing/2014/main" id="{CB381E5E-0FAF-D144-B905-6A8F86A608AE}"/>
+              </a:ext>
+            </a:extLst>
+          </p:cNvPr>
+          <p:cNvSpPr>
+            <a:spLocks noGrp="1"/>
+          </p:cNvSpPr>
+          <p:nvPr>
+            <p:ph idx="1"/>
+          </p:nvPr>
+        </p:nvSpPr>
+        <p:spPr/>
+        <p:txBody>
+          <a:bodyPr>
+            <a:normAutofit/>
+          </a:bodyPr>
+          <a:lstStyle/>
+          <a:p>
+            <a:r>
+              <a:rPr lang="en-US" dirty="0"/>
+              <a:t>Software should behave predictably and accomplish its goals without too many surprises (that is, outages in production). </a:t>
+            </a:r>
+          </a:p>
+          <a:p>
+            <a:r>
+              <a:rPr lang="en-US" dirty="0"/>
+              <a:t>The number of surprises directly correlates with the amount of unnecessary complexity found in a project.</a:t>
+            </a:r>
+          </a:p>
+          <a:p>
+            <a:r>
+              <a:rPr lang="en-US" i="1" dirty="0"/>
+              <a:t>Accidental complexity relates to problems which engineers create and can fix, [whereas] essential complexity is caused by the problem to be solved, and nothing can remove it – Fred Brooks in his seminal “No Silver Bullet” essay</a:t>
+            </a:r>
+          </a:p>
+          <a:p>
+            <a:r>
+              <a:rPr lang="en-US" dirty="0"/>
+              <a:t>Push back when accidental complexity is introduced. </a:t>
+            </a:r>
+          </a:p>
+        </p:txBody>
+      </p:sp>
+    </p:spTree>
+    <p:extLst>
+      <p:ext uri="{BB962C8B-B14F-4D97-AF65-F5344CB8AC3E}">
+        <p14:creationId xmlns:p14="http://schemas.microsoft.com/office/powerpoint/2010/main" val="210959948"/>
+      </p:ext>
+    </p:extLst>
+  </p:cSld>
+  <p:clrMapOvr>
+    <a:masterClrMapping/>
+  </p:clrMapOvr>
+  <mc:AlternateContent xmlns:mc="http://schemas.openxmlformats.org/markup-compatibility/2006" xmlns:p14="http://schemas.microsoft.com/office/powerpoint/2010/main">
+    <mc:Choice Requires="p14">
+      <p:transition spd="med" p14:dur="700">
+        <p:fade/>
+      </p:transition>
+    </mc:Choice>
+    <mc:Fallback xmlns="">
+      <p:transition spd="med">
+        <p:fade/>
+      </p:transition>
+    </mc:Fallback>
+  </mc:AlternateContent>
+  <p:timing>
+    <p:tnLst>
+      <p:par>
+        <p:cTn id="1" dur="indefinite" restart="never" nodeType="tmRoot">
+          <p:childTnLst>
+            <p:seq concurrent="1" nextAc="seek">
+              <p:cTn id="2" dur="indefinite" nodeType="mainSeq">
+                <p:childTnLst>
+                  <p:par>
+                    <p:cTn id="3" fill="hold">
+                      <p:stCondLst>
+                        <p:cond delay="indefinite"/>
+                      </p:stCondLst>
+                      <p:childTnLst>
+                        <p:par>
+                          <p:cTn id="4" fill="hold">
+                            <p:stCondLst>
+                              <p:cond delay="0"/>
+                            </p:stCondLst>
+                            <p:childTnLst>
+                              <p:par>
+                                <p:cTn id="5" presetID="1" presetClass="entr" presetSubtype="0" fill="hold" grpId="0" nodeType="clickEffect">
+                                  <p:stCondLst>
+                                    <p:cond delay="0"/>
+                                  </p:stCondLst>
+                                  <p:childTnLst>
+                                    <p:set>
+                                      <p:cBhvr>
+                                        <p:cTn id="6" dur="1" fill="hold">
+                                          <p:stCondLst>
+                                            <p:cond delay="0"/>
+                                          </p:stCondLst>
+                                        </p:cTn>
+                                        <p:tgtEl>
+                                          <p:spTgt spid="3">
+                                            <p:txEl>
+                                              <p:pRg st="0" end="0"/>
+                                            </p:txEl>
+                                          </p:spTgt>
+                                        </p:tgtEl>
+                                        <p:attrNameLst>
+                                          <p:attrName>style.visibility</p:attrName>
+                                        </p:attrNameLst>
+                                      </p:cBhvr>
+                                      <p:to>
+                                        <p:strVal val="visible"/>
+                                      </p:to>
+                                    </p:set>
+                                  </p:childTnLst>
+                                </p:cTn>
+                              </p:par>
+                            </p:childTnLst>
+                          </p:cTn>
+                        </p:par>
+                      </p:childTnLst>
+                    </p:cTn>
+                  </p:par>
+                  <p:par>
+                    <p:cTn id="7" fill="hold">
+                      <p:stCondLst>
+                        <p:cond delay="indefinite"/>
+                      </p:stCondLst>
+                      <p:childTnLst>
+                        <p:par>
+                          <p:cTn id="8" fill="hold">
+                            <p:stCondLst>
+                              <p:cond delay="0"/>
+                            </p:stCondLst>
+                            <p:childTnLst>
+                              <p:par>
+                                <p:cTn id="9" presetID="1" presetClass="entr" presetSubtype="0" fill="hold" grpId="0" nodeType="clickEffect">
+                                  <p:stCondLst>
+                                    <p:cond delay="0"/>
+                                  </p:stCondLst>
+                                  <p:childTnLst>
+                                    <p:set>
+                                      <p:cBhvr>
+                                        <p:cTn id="10" dur="1" fill="hold">
+                                          <p:stCondLst>
+                                            <p:cond delay="0"/>
+                                          </p:stCondLst>
+                                        </p:cTn>
+                                        <p:tgtEl>
+                                          <p:spTgt spid="3">
+                                            <p:txEl>
+                                              <p:pRg st="1" end="1"/>
+                                            </p:txEl>
+                                          </p:spTgt>
+                                        </p:tgtEl>
+                                        <p:attrNameLst>
+                                          <p:attrName>style.visibility</p:attrName>
+                                        </p:attrNameLst>
+                                      </p:cBhvr>
+                                      <p:to>
+                                        <p:strVal val="visible"/>
+                                      </p:to>
+                                    </p:set>
+                                  </p:childTnLst>
+                                </p:cTn>
+                              </p:par>
+                            </p:childTnLst>
+                          </p:cTn>
+                        </p:par>
+                      </p:childTnLst>
+                    </p:cTn>
+                  </p:par>
+                  <p:par>
+                    <p:cTn id="11" fill="hold">
+                      <p:stCondLst>
+                        <p:cond delay="indefinite"/>
+                      </p:stCondLst>
+                      <p:childTnLst>
+                        <p:par>
+                          <p:cTn id="12" fill="hold">
+                            <p:stCondLst>
+                              <p:cond delay="0"/>
+                            </p:stCondLst>
+                            <p:childTnLst>
+                              <p:par>
+                                <p:cTn id="13" presetID="1" presetClass="entr" presetSubtype="0" fill="hold" grpId="0" nodeType="clickEffect">
+                                  <p:stCondLst>
+                                    <p:cond delay="0"/>
+                                  </p:stCondLst>
+                                  <p:childTnLst>
+                                    <p:set>
+                                      <p:cBhvr>
+                                        <p:cTn id="14" dur="1" fill="hold">
+                                          <p:stCondLst>
+                                            <p:cond delay="0"/>
+                                          </p:stCondLst>
+                                        </p:cTn>
+                                        <p:tgtEl>
+                                          <p:spTgt spid="3">
+                                            <p:txEl>
+                                              <p:pRg st="2" end="2"/>
+                                            </p:txEl>
+                                          </p:spTgt>
+                                        </p:tgtEl>
+                                        <p:attrNameLst>
+                                          <p:attrName>style.visibility</p:attrName>
+                                        </p:attrNameLst>
+                                      </p:cBhvr>
+                                      <p:to>
+                                        <p:strVal val="visible"/>
+                                      </p:to>
+                                    </p:set>
+                                  </p:childTnLst>
+                                </p:cTn>
+                              </p:par>
+                            </p:childTnLst>
+                          </p:cTn>
+                        </p:par>
+                      </p:childTnLst>
+                    </p:cTn>
+                  </p:par>
+                  <p:par>
+                    <p:cTn id="15" fill="hold">
+                      <p:stCondLst>
+                        <p:cond delay="indefinite"/>
+                      </p:stCondLst>
+                      <p:childTnLst>
+                        <p:par>
+                          <p:cTn id="16" fill="hold">
+                            <p:stCondLst>
+                              <p:cond delay="0"/>
+                            </p:stCondLst>
+                            <p:childTnLst>
+                              <p:par>
+                                <p:cTn id="17" presetID="1" presetClass="entr" presetSubtype="0" fill="hold" grpId="0" nodeType="clickEffect">
+                                  <p:stCondLst>
+                                    <p:cond delay="0"/>
+                                  </p:stCondLst>
+                                  <p:childTnLst>
+                                    <p:set>
+                                      <p:cBhvr>
+                                        <p:cTn id="18" dur="1" fill="hold">
+                                          <p:stCondLst>
+                                            <p:cond delay="0"/>
+                                          </p:stCondLst>
+                                        </p:cTn>
+                                        <p:tgtEl>
+                                          <p:spTgt spid="3">
+                                            <p:txEl>
+                                              <p:pRg st="3" end="3"/>
+                                            </p:txEl>
+                                          </p:spTgt>
+                                        </p:tgtEl>
+                                        <p:attrNameLst>
+                                          <p:attrName>style.visibility</p:attrName>
+                                        </p:attrNameLst>
+                                      </p:cBhvr>
+                                      <p:to>
+                                        <p:strVal val="visible"/>
+                                      </p:to>
+                                    </p:set>
+                                  </p:childTnLst>
+                                </p:cTn>
+                              </p:par>
+                            </p:childTnLst>
+                          </p:cTn>
+                        </p:par>
+                      </p:childTnLst>
+                    </p:cTn>
+                  </p:par>
+                </p:childTnLst>
+              </p:cTn>
+              <p:prevCondLst>
+                <p:cond evt="onPrev" delay="0">
+                  <p:tgtEl>
+                    <p:sldTgt/>
+                  </p:tgtEl>
+                </p:cond>
+              </p:prevCondLst>
+              <p:nextCondLst>
+                <p:cond evt="onNext" delay="0">
+                  <p:tgtEl>
+                    <p:sldTgt/>
+                  </p:tgtEl>
+                </p:cond>
+              </p:nextCondLst>
+            </p:seq>
+          </p:childTnLst>
+        </p:cTn>
+      </p:par>
+    </p:tnLst>
+    <p:bldLst>
+      <p:bldP spid="3" grpId="0" build="p"/>
+    </p:bldLst>
+  </p:timing>
+</p:sld>
+</file>
+
+<file path=ppt/slides/slide11.xml><?xml version="1.0" encoding="utf-8"?>
 <p:sld xmlns:a="http://schemas.openxmlformats.org/drawingml/2006/main" xmlns:r="http://schemas.openxmlformats.org/officeDocument/2006/relationships" xmlns:p="http://schemas.openxmlformats.org/presentationml/2006/main">
   <p:cSld>
     <p:spTree>
@@ -3997,13 +4344,13 @@
   <p:clrMapOvr>
     <a:masterClrMapping/>
   </p:clrMapOvr>
-  <mc:AlternateContent xmlns:mc="http://schemas.openxmlformats.org/markup-compatibility/2006">
-    <mc:Choice xmlns:p14="http://schemas.microsoft.com/office/powerpoint/2010/main" Requires="p14">
+  <mc:AlternateContent xmlns:mc="http://schemas.openxmlformats.org/markup-compatibility/2006" xmlns:p14="http://schemas.microsoft.com/office/powerpoint/2010/main">
+    <mc:Choice Requires="p14">
       <p:transition spd="med" p14:dur="700">
         <p:fade/>
       </p:transition>
     </mc:Choice>
-    <mc:Fallback>
+    <mc:Fallback xmlns="">
       <p:transition spd="med">
         <p:fade/>
       </p:transition>
@@ -4321,7 +4668,7 @@
 </p:sld>
 </file>
 
-<file path=ppt/slides/slide11.xml><?xml version="1.0" encoding="utf-8"?>
+<file path=ppt/slides/slide12.xml><?xml version="1.0" encoding="utf-8"?>
 <p:sld xmlns:a="http://schemas.openxmlformats.org/drawingml/2006/main" xmlns:r="http://schemas.openxmlformats.org/officeDocument/2006/relationships" xmlns:p="http://schemas.openxmlformats.org/presentationml/2006/main">
   <p:cSld>
     <p:spTree>
@@ -4445,13 +4792,13 @@
   <p:clrMapOvr>
     <a:masterClrMapping/>
   </p:clrMapOvr>
-  <mc:AlternateContent xmlns:mc="http://schemas.openxmlformats.org/markup-compatibility/2006">
-    <mc:Choice xmlns:p14="http://schemas.microsoft.com/office/powerpoint/2010/main" Requires="p14">
+  <mc:AlternateContent xmlns:mc="http://schemas.openxmlformats.org/markup-compatibility/2006" xmlns:p14="http://schemas.microsoft.com/office/powerpoint/2010/main">
+    <mc:Choice Requires="p14">
       <p:transition spd="med" p14:dur="700">
         <p:fade/>
       </p:transition>
     </mc:Choice>
-    <mc:Fallback>
+    <mc:Fallback xmlns="">
       <p:transition spd="med">
         <p:fade/>
       </p:transition>
@@ -4746,7 +5093,7 @@
 </p:sld>
 </file>
 
-<file path=ppt/slides/slide12.xml><?xml version="1.0" encoding="utf-8"?>
+<file path=ppt/slides/slide13.xml><?xml version="1.0" encoding="utf-8"?>
 <p:sld xmlns:a="http://schemas.openxmlformats.org/drawingml/2006/main" xmlns:r="http://schemas.openxmlformats.org/officeDocument/2006/relationships" xmlns:p="http://schemas.openxmlformats.org/presentationml/2006/main">
   <p:cSld>
     <p:spTree>
@@ -4883,13 +5230,13 @@
   <p:clrMapOvr>
     <a:masterClrMapping/>
   </p:clrMapOvr>
-  <mc:AlternateContent xmlns:mc="http://schemas.openxmlformats.org/markup-compatibility/2006">
-    <mc:Choice xmlns:p14="http://schemas.microsoft.com/office/powerpoint/2010/main" Requires="p14">
+  <mc:AlternateContent xmlns:mc="http://schemas.openxmlformats.org/markup-compatibility/2006" xmlns:p14="http://schemas.microsoft.com/office/powerpoint/2010/main">
+    <mc:Choice Requires="p14">
       <p:transition spd="med" p14:dur="700">
         <p:fade/>
       </p:transition>
     </mc:Choice>
-    <mc:Fallback>
+    <mc:Fallback xmlns="">
       <p:transition spd="med">
         <p:fade/>
       </p:transition>
@@ -5269,485 +5616,6 @@
 </p:sld>
 </file>
 
-<file path=ppt/slides/slide13.xml><?xml version="1.0" encoding="utf-8"?>
-<p:sld xmlns:a="http://schemas.openxmlformats.org/drawingml/2006/main" xmlns:r="http://schemas.openxmlformats.org/officeDocument/2006/relationships" xmlns:p="http://schemas.openxmlformats.org/presentationml/2006/main">
-  <p:cSld>
-    <p:spTree>
-      <p:nvGrpSpPr>
-        <p:cNvPr id="1" name=""/>
-        <p:cNvGrpSpPr/>
-        <p:nvPr/>
-      </p:nvGrpSpPr>
-      <p:grpSpPr>
-        <a:xfrm>
-          <a:off x="0" y="0"/>
-          <a:ext cx="0" cy="0"/>
-          <a:chOff x="0" y="0"/>
-          <a:chExt cx="0" cy="0"/>
-        </a:xfrm>
-      </p:grpSpPr>
-      <p:sp>
-        <p:nvSpPr>
-          <p:cNvPr id="2" name="Title 1">
-            <a:extLst>
-              <a:ext uri="{FF2B5EF4-FFF2-40B4-BE49-F238E27FC236}">
-                <a16:creationId xmlns:a16="http://schemas.microsoft.com/office/drawing/2014/main" id="{977B8AF1-3C5A-5B40-A022-7A684DB3C5B7}"/>
-              </a:ext>
-            </a:extLst>
-          </p:cNvPr>
-          <p:cNvSpPr>
-            <a:spLocks noGrp="1"/>
-          </p:cNvSpPr>
-          <p:nvPr>
-            <p:ph type="title"/>
-          </p:nvPr>
-        </p:nvSpPr>
-        <p:spPr/>
-        <p:txBody>
-          <a:bodyPr/>
-          <a:lstStyle/>
-          <a:p>
-            <a:r>
-              <a:rPr lang="en-US" b="1" dirty="0"/>
-              <a:t>Unit testing as a feedback loop</a:t>
-            </a:r>
-          </a:p>
-        </p:txBody>
-      </p:sp>
-      <p:sp>
-        <p:nvSpPr>
-          <p:cNvPr id="3" name="Content Placeholder 2">
-            <a:extLst>
-              <a:ext uri="{FF2B5EF4-FFF2-40B4-BE49-F238E27FC236}">
-                <a16:creationId xmlns:a16="http://schemas.microsoft.com/office/drawing/2014/main" id="{62151239-2C8C-5C47-B029-8E279A296E76}"/>
-              </a:ext>
-            </a:extLst>
-          </p:cNvPr>
-          <p:cNvSpPr>
-            <a:spLocks noGrp="1"/>
-          </p:cNvSpPr>
-          <p:nvPr>
-            <p:ph idx="1"/>
-          </p:nvPr>
-        </p:nvSpPr>
-        <p:spPr/>
-        <p:txBody>
-          <a:bodyPr/>
-          <a:lstStyle/>
-          <a:p>
-            <a:r>
-              <a:rPr lang="en-US" dirty="0"/>
-              <a:t>We apply feedback loops to every level of our development. </a:t>
-            </a:r>
-          </a:p>
-          <a:p>
-            <a:r>
-              <a:rPr lang="en-US" dirty="0"/>
-              <a:t>Unit testing is a feedback loop that occurs within seconds. </a:t>
-            </a:r>
-          </a:p>
-          <a:p>
-            <a:r>
-              <a:rPr lang="en-US" dirty="0"/>
-              <a:t>Quick execution of a unit test provides us with information.</a:t>
-            </a:r>
-          </a:p>
-          <a:p>
-            <a:r>
-              <a:rPr lang="en-US" dirty="0"/>
-              <a:t>Constant testing can catch regression errors.</a:t>
-            </a:r>
-          </a:p>
-          <a:p>
-            <a:r>
-              <a:rPr lang="en-US" dirty="0"/>
-              <a:t>Test-driven development gives us feedback on...</a:t>
-            </a:r>
-          </a:p>
-          <a:p>
-            <a:pPr lvl="1"/>
-            <a:r>
-              <a:rPr lang="en-US" dirty="0"/>
-              <a:t>Quality of the implementation (does it work)</a:t>
-            </a:r>
-          </a:p>
-          <a:p>
-            <a:pPr lvl="1"/>
-            <a:r>
-              <a:rPr lang="en-US" dirty="0"/>
-              <a:t>Quality of the code design (is it well structured)</a:t>
-            </a:r>
-          </a:p>
-          <a:p>
-            <a:endParaRPr lang="en-US" dirty="0"/>
-          </a:p>
-        </p:txBody>
-      </p:sp>
-    </p:spTree>
-    <p:extLst>
-      <p:ext uri="{BB962C8B-B14F-4D97-AF65-F5344CB8AC3E}">
-        <p14:creationId xmlns:p14="http://schemas.microsoft.com/office/powerpoint/2010/main" val="387847106"/>
-      </p:ext>
-    </p:extLst>
-  </p:cSld>
-  <p:clrMapOvr>
-    <a:masterClrMapping/>
-  </p:clrMapOvr>
-  <mc:AlternateContent xmlns:mc="http://schemas.openxmlformats.org/markup-compatibility/2006">
-    <mc:Choice xmlns:p14="http://schemas.microsoft.com/office/powerpoint/2010/main" Requires="p14">
-      <p:transition spd="med" p14:dur="700">
-        <p:fade/>
-      </p:transition>
-    </mc:Choice>
-    <mc:Fallback>
-      <p:transition spd="med">
-        <p:fade/>
-      </p:transition>
-    </mc:Fallback>
-  </mc:AlternateContent>
-  <p:timing>
-    <p:tnLst>
-      <p:par>
-        <p:cTn id="1" dur="indefinite" restart="never" nodeType="tmRoot">
-          <p:childTnLst>
-            <p:seq concurrent="1" nextAc="seek">
-              <p:cTn id="2" dur="indefinite" nodeType="mainSeq">
-                <p:childTnLst>
-                  <p:par>
-                    <p:cTn id="3" fill="hold">
-                      <p:stCondLst>
-                        <p:cond delay="indefinite"/>
-                      </p:stCondLst>
-                      <p:childTnLst>
-                        <p:par>
-                          <p:cTn id="4" fill="hold">
-                            <p:stCondLst>
-                              <p:cond delay="0"/>
-                            </p:stCondLst>
-                            <p:childTnLst>
-                              <p:par>
-                                <p:cTn id="5" presetID="1" presetClass="entr" presetSubtype="0" fill="hold" grpId="0" nodeType="clickEffect">
-                                  <p:stCondLst>
-                                    <p:cond delay="0"/>
-                                  </p:stCondLst>
-                                  <p:childTnLst>
-                                    <p:set>
-                                      <p:cBhvr>
-                                        <p:cTn id="6" dur="1" fill="hold">
-                                          <p:stCondLst>
-                                            <p:cond delay="0"/>
-                                          </p:stCondLst>
-                                        </p:cTn>
-                                        <p:tgtEl>
-                                          <p:spTgt spid="3">
-                                            <p:txEl>
-                                              <p:pRg st="0" end="0"/>
-                                            </p:txEl>
-                                          </p:spTgt>
-                                        </p:tgtEl>
-                                        <p:attrNameLst>
-                                          <p:attrName>style.visibility</p:attrName>
-                                        </p:attrNameLst>
-                                      </p:cBhvr>
-                                      <p:to>
-                                        <p:strVal val="visible"/>
-                                      </p:to>
-                                    </p:set>
-                                  </p:childTnLst>
-                                </p:cTn>
-                              </p:par>
-                            </p:childTnLst>
-                          </p:cTn>
-                        </p:par>
-                      </p:childTnLst>
-                    </p:cTn>
-                  </p:par>
-                  <p:par>
-                    <p:cTn id="7" fill="hold">
-                      <p:stCondLst>
-                        <p:cond delay="indefinite"/>
-                      </p:stCondLst>
-                      <p:childTnLst>
-                        <p:par>
-                          <p:cTn id="8" fill="hold">
-                            <p:stCondLst>
-                              <p:cond delay="0"/>
-                            </p:stCondLst>
-                            <p:childTnLst>
-                              <p:par>
-                                <p:cTn id="9" presetID="1" presetClass="entr" presetSubtype="0" fill="hold" grpId="0" nodeType="clickEffect">
-                                  <p:stCondLst>
-                                    <p:cond delay="0"/>
-                                  </p:stCondLst>
-                                  <p:childTnLst>
-                                    <p:set>
-                                      <p:cBhvr>
-                                        <p:cTn id="10" dur="1" fill="hold">
-                                          <p:stCondLst>
-                                            <p:cond delay="0"/>
-                                          </p:stCondLst>
-                                        </p:cTn>
-                                        <p:tgtEl>
-                                          <p:spTgt spid="3">
-                                            <p:txEl>
-                                              <p:pRg st="1" end="1"/>
-                                            </p:txEl>
-                                          </p:spTgt>
-                                        </p:tgtEl>
-                                        <p:attrNameLst>
-                                          <p:attrName>style.visibility</p:attrName>
-                                        </p:attrNameLst>
-                                      </p:cBhvr>
-                                      <p:to>
-                                        <p:strVal val="visible"/>
-                                      </p:to>
-                                    </p:set>
-                                  </p:childTnLst>
-                                </p:cTn>
-                              </p:par>
-                            </p:childTnLst>
-                          </p:cTn>
-                        </p:par>
-                      </p:childTnLst>
-                    </p:cTn>
-                  </p:par>
-                  <p:par>
-                    <p:cTn id="11" fill="hold">
-                      <p:stCondLst>
-                        <p:cond delay="indefinite"/>
-                      </p:stCondLst>
-                      <p:childTnLst>
-                        <p:par>
-                          <p:cTn id="12" fill="hold">
-                            <p:stCondLst>
-                              <p:cond delay="0"/>
-                            </p:stCondLst>
-                            <p:childTnLst>
-                              <p:par>
-                                <p:cTn id="13" presetID="1" presetClass="entr" presetSubtype="0" fill="hold" grpId="0" nodeType="clickEffect">
-                                  <p:stCondLst>
-                                    <p:cond delay="0"/>
-                                  </p:stCondLst>
-                                  <p:childTnLst>
-                                    <p:set>
-                                      <p:cBhvr>
-                                        <p:cTn id="14" dur="1" fill="hold">
-                                          <p:stCondLst>
-                                            <p:cond delay="0"/>
-                                          </p:stCondLst>
-                                        </p:cTn>
-                                        <p:tgtEl>
-                                          <p:spTgt spid="3">
-                                            <p:txEl>
-                                              <p:pRg st="2" end="2"/>
-                                            </p:txEl>
-                                          </p:spTgt>
-                                        </p:tgtEl>
-                                        <p:attrNameLst>
-                                          <p:attrName>style.visibility</p:attrName>
-                                        </p:attrNameLst>
-                                      </p:cBhvr>
-                                      <p:to>
-                                        <p:strVal val="visible"/>
-                                      </p:to>
-                                    </p:set>
-                                  </p:childTnLst>
-                                </p:cTn>
-                              </p:par>
-                            </p:childTnLst>
-                          </p:cTn>
-                        </p:par>
-                      </p:childTnLst>
-                    </p:cTn>
-                  </p:par>
-                  <p:par>
-                    <p:cTn id="15" fill="hold">
-                      <p:stCondLst>
-                        <p:cond delay="indefinite"/>
-                      </p:stCondLst>
-                      <p:childTnLst>
-                        <p:par>
-                          <p:cTn id="16" fill="hold">
-                            <p:stCondLst>
-                              <p:cond delay="0"/>
-                            </p:stCondLst>
-                            <p:childTnLst>
-                              <p:par>
-                                <p:cTn id="17" presetID="1" presetClass="entr" presetSubtype="0" fill="hold" grpId="0" nodeType="clickEffect">
-                                  <p:stCondLst>
-                                    <p:cond delay="0"/>
-                                  </p:stCondLst>
-                                  <p:childTnLst>
-                                    <p:set>
-                                      <p:cBhvr>
-                                        <p:cTn id="18" dur="1" fill="hold">
-                                          <p:stCondLst>
-                                            <p:cond delay="0"/>
-                                          </p:stCondLst>
-                                        </p:cTn>
-                                        <p:tgtEl>
-                                          <p:spTgt spid="3">
-                                            <p:txEl>
-                                              <p:pRg st="3" end="3"/>
-                                            </p:txEl>
-                                          </p:spTgt>
-                                        </p:tgtEl>
-                                        <p:attrNameLst>
-                                          <p:attrName>style.visibility</p:attrName>
-                                        </p:attrNameLst>
-                                      </p:cBhvr>
-                                      <p:to>
-                                        <p:strVal val="visible"/>
-                                      </p:to>
-                                    </p:set>
-                                  </p:childTnLst>
-                                </p:cTn>
-                              </p:par>
-                            </p:childTnLst>
-                          </p:cTn>
-                        </p:par>
-                      </p:childTnLst>
-                    </p:cTn>
-                  </p:par>
-                  <p:par>
-                    <p:cTn id="19" fill="hold">
-                      <p:stCondLst>
-                        <p:cond delay="indefinite"/>
-                      </p:stCondLst>
-                      <p:childTnLst>
-                        <p:par>
-                          <p:cTn id="20" fill="hold">
-                            <p:stCondLst>
-                              <p:cond delay="0"/>
-                            </p:stCondLst>
-                            <p:childTnLst>
-                              <p:par>
-                                <p:cTn id="21" presetID="1" presetClass="entr" presetSubtype="0" fill="hold" grpId="0" nodeType="clickEffect">
-                                  <p:stCondLst>
-                                    <p:cond delay="0"/>
-                                  </p:stCondLst>
-                                  <p:childTnLst>
-                                    <p:set>
-                                      <p:cBhvr>
-                                        <p:cTn id="22" dur="1" fill="hold">
-                                          <p:stCondLst>
-                                            <p:cond delay="0"/>
-                                          </p:stCondLst>
-                                        </p:cTn>
-                                        <p:tgtEl>
-                                          <p:spTgt spid="3">
-                                            <p:txEl>
-                                              <p:pRg st="4" end="4"/>
-                                            </p:txEl>
-                                          </p:spTgt>
-                                        </p:tgtEl>
-                                        <p:attrNameLst>
-                                          <p:attrName>style.visibility</p:attrName>
-                                        </p:attrNameLst>
-                                      </p:cBhvr>
-                                      <p:to>
-                                        <p:strVal val="visible"/>
-                                      </p:to>
-                                    </p:set>
-                                  </p:childTnLst>
-                                </p:cTn>
-                              </p:par>
-                              <p:par>
-                                <p:cTn id="23" presetID="1" presetClass="entr" presetSubtype="0" fill="hold" grpId="0" nodeType="withEffect">
-                                  <p:stCondLst>
-                                    <p:cond delay="0"/>
-                                  </p:stCondLst>
-                                  <p:childTnLst>
-                                    <p:set>
-                                      <p:cBhvr>
-                                        <p:cTn id="24" dur="1" fill="hold">
-                                          <p:stCondLst>
-                                            <p:cond delay="0"/>
-                                          </p:stCondLst>
-                                        </p:cTn>
-                                        <p:tgtEl>
-                                          <p:spTgt spid="3">
-                                            <p:txEl>
-                                              <p:pRg st="5" end="5"/>
-                                            </p:txEl>
-                                          </p:spTgt>
-                                        </p:tgtEl>
-                                        <p:attrNameLst>
-                                          <p:attrName>style.visibility</p:attrName>
-                                        </p:attrNameLst>
-                                      </p:cBhvr>
-                                      <p:to>
-                                        <p:strVal val="visible"/>
-                                      </p:to>
-                                    </p:set>
-                                  </p:childTnLst>
-                                </p:cTn>
-                              </p:par>
-                              <p:par>
-                                <p:cTn id="25" presetID="1" presetClass="entr" presetSubtype="0" fill="hold" grpId="0" nodeType="withEffect">
-                                  <p:stCondLst>
-                                    <p:cond delay="0"/>
-                                  </p:stCondLst>
-                                  <p:childTnLst>
-                                    <p:set>
-                                      <p:cBhvr>
-                                        <p:cTn id="26" dur="1" fill="hold">
-                                          <p:stCondLst>
-                                            <p:cond delay="0"/>
-                                          </p:stCondLst>
-                                        </p:cTn>
-                                        <p:tgtEl>
-                                          <p:spTgt spid="3">
-                                            <p:txEl>
-                                              <p:pRg st="6" end="6"/>
-                                            </p:txEl>
-                                          </p:spTgt>
-                                        </p:tgtEl>
-                                        <p:attrNameLst>
-                                          <p:attrName>style.visibility</p:attrName>
-                                        </p:attrNameLst>
-                                      </p:cBhvr>
-                                      <p:to>
-                                        <p:strVal val="visible"/>
-                                      </p:to>
-                                    </p:set>
-                                  </p:childTnLst>
-                                </p:cTn>
-                              </p:par>
-                            </p:childTnLst>
-                          </p:cTn>
-                        </p:par>
-                      </p:childTnLst>
-                    </p:cTn>
-                  </p:par>
-                </p:childTnLst>
-              </p:cTn>
-              <p:prevCondLst>
-                <p:cond evt="onPrev" delay="0">
-                  <p:tgtEl>
-                    <p:sldTgt/>
-                  </p:tgtEl>
-                </p:cond>
-              </p:prevCondLst>
-              <p:nextCondLst>
-                <p:cond evt="onNext" delay="0">
-                  <p:tgtEl>
-                    <p:sldTgt/>
-                  </p:tgtEl>
-                </p:cond>
-              </p:nextCondLst>
-            </p:seq>
-          </p:childTnLst>
-        </p:cTn>
-      </p:par>
-    </p:tnLst>
-    <p:bldLst>
-      <p:bldP spid="3" grpId="0" build="p"/>
-    </p:bldLst>
-  </p:timing>
-</p:sld>
-</file>
-
 <file path=ppt/slides/slide14.xml><?xml version="1.0" encoding="utf-8"?>
 <p:sld xmlns:a="http://schemas.openxmlformats.org/drawingml/2006/main" xmlns:r="http://schemas.openxmlformats.org/officeDocument/2006/relationships" xmlns:p="http://schemas.openxmlformats.org/presentationml/2006/main">
   <p:cSld>
@@ -5861,13 +5729,13 @@
   <p:clrMapOvr>
     <a:masterClrMapping/>
   </p:clrMapOvr>
-  <mc:AlternateContent xmlns:mc="http://schemas.openxmlformats.org/markup-compatibility/2006">
-    <mc:Choice xmlns:p14="http://schemas.microsoft.com/office/powerpoint/2010/main" Requires="p14">
+  <mc:AlternateContent xmlns:mc="http://schemas.openxmlformats.org/markup-compatibility/2006" xmlns:p14="http://schemas.microsoft.com/office/powerpoint/2010/main">
+    <mc:Choice Requires="p14">
       <p:transition spd="med" p14:dur="700">
         <p:fade/>
       </p:transition>
     </mc:Choice>
-    <mc:Fallback>
+    <mc:Fallback xmlns="">
       <p:transition spd="med">
         <p:fade/>
       </p:transition>
@@ -6223,13 +6091,13 @@
   <p:clrMapOvr>
     <a:masterClrMapping/>
   </p:clrMapOvr>
-  <mc:AlternateContent xmlns:mc="http://schemas.openxmlformats.org/markup-compatibility/2006">
-    <mc:Choice xmlns:p14="http://schemas.microsoft.com/office/powerpoint/2010/main" Requires="p14">
+  <mc:AlternateContent xmlns:mc="http://schemas.openxmlformats.org/markup-compatibility/2006" xmlns:p14="http://schemas.microsoft.com/office/powerpoint/2010/main">
+    <mc:Choice Requires="p14">
       <p:transition spd="med" p14:dur="700">
         <p:fade/>
       </p:transition>
     </mc:Choice>
-    <mc:Fallback>
+    <mc:Fallback xmlns="">
       <p:transition spd="med">
         <p:fade/>
       </p:transition>
@@ -6547,13 +6415,13 @@
   <p:clrMapOvr>
     <a:masterClrMapping/>
   </p:clrMapOvr>
-  <mc:AlternateContent xmlns:mc="http://schemas.openxmlformats.org/markup-compatibility/2006">
-    <mc:Choice xmlns:p14="http://schemas.microsoft.com/office/powerpoint/2010/main" Requires="p14">
+  <mc:AlternateContent xmlns:mc="http://schemas.openxmlformats.org/markup-compatibility/2006" xmlns:p14="http://schemas.microsoft.com/office/powerpoint/2010/main">
+    <mc:Choice Requires="p14">
       <p:transition spd="med" p14:dur="700">
         <p:fade/>
       </p:transition>
     </mc:Choice>
-    <mc:Fallback>
+    <mc:Fallback xmlns="">
       <p:transition spd="med">
         <p:fade/>
       </p:transition>
@@ -6860,13 +6728,13 @@
   <p:clrMapOvr>
     <a:masterClrMapping/>
   </p:clrMapOvr>
-  <mc:AlternateContent xmlns:mc="http://schemas.openxmlformats.org/markup-compatibility/2006">
-    <mc:Choice xmlns:p14="http://schemas.microsoft.com/office/powerpoint/2010/main" Requires="p14">
+  <mc:AlternateContent xmlns:mc="http://schemas.openxmlformats.org/markup-compatibility/2006" xmlns:p14="http://schemas.microsoft.com/office/powerpoint/2010/main">
+    <mc:Choice Requires="p14">
       <p:transition spd="med" p14:dur="700">
         <p:fade/>
       </p:transition>
     </mc:Choice>
-    <mc:Fallback>
+    <mc:Fallback xmlns="">
       <p:transition spd="med">
         <p:fade/>
       </p:transition>
@@ -7356,19 +7224,27 @@
           <a:p>
             <a:r>
               <a:rPr lang="en-US" dirty="0"/>
-              <a:t>Tests are isolated and use test doubles for dependencies</a:t>
+              <a:t>Tests are isolated and use test doubles for dependency isolation</a:t>
             </a:r>
           </a:p>
           <a:p>
             <a:r>
               <a:rPr lang="en-US" dirty="0"/>
-              <a:t>Tests execute quickly</a:t>
-            </a:r>
-          </a:p>
-          <a:p>
+              <a:t>Tests execute quickly (</a:t>
+            </a:r>
+            <a:r>
+              <a:rPr lang="en-US" dirty="0" err="1"/>
+              <a:t>ms</a:t>
+            </a:r>
             <a:r>
               <a:rPr lang="en-US" dirty="0"/>
-              <a:t>Easy to test exceptional scenarios</a:t>
+              <a:t>)</a:t>
+            </a:r>
+          </a:p>
+          <a:p>
+            <a:r>
+              <a:rPr lang="en-US" dirty="0"/>
+              <a:t>Easy to test exceptional pathways through the code</a:t>
             </a:r>
           </a:p>
         </p:txBody>
@@ -7444,8 +7320,13 @@
           <a:p>
             <a:r>
               <a:rPr lang="en-US" dirty="0"/>
-              <a:t>Tests require setup and can be slower to execute</a:t>
-            </a:r>
+              <a:t>Tests require setup and can be slower to execute </a:t>
+            </a:r>
+            <a:r>
+              <a:rPr lang="en-US"/>
+              <a:t>(seconds)</a:t>
+            </a:r>
+            <a:endParaRPr lang="en-US" dirty="0"/>
           </a:p>
           <a:p>
             <a:r>
@@ -7465,13 +7346,13 @@
   <p:clrMapOvr>
     <a:masterClrMapping/>
   </p:clrMapOvr>
-  <mc:AlternateContent xmlns:mc="http://schemas.openxmlformats.org/markup-compatibility/2006">
-    <mc:Choice xmlns:p14="http://schemas.microsoft.com/office/powerpoint/2010/main" Requires="p14">
+  <mc:AlternateContent xmlns:mc="http://schemas.openxmlformats.org/markup-compatibility/2006" xmlns:p14="http://schemas.microsoft.com/office/powerpoint/2010/main">
+    <mc:Choice Requires="p14">
       <p:transition spd="med" p14:dur="700">
         <p:fade/>
       </p:transition>
     </mc:Choice>
-    <mc:Fallback>
+    <mc:Fallback xmlns="">
       <p:transition spd="med">
         <p:fade/>
       </p:transition>
@@ -8122,13 +8003,13 @@
   <p:clrMapOvr>
     <a:masterClrMapping/>
   </p:clrMapOvr>
-  <mc:AlternateContent xmlns:mc="http://schemas.openxmlformats.org/markup-compatibility/2006">
-    <mc:Choice xmlns:p14="http://schemas.microsoft.com/office/powerpoint/2010/main" Requires="p14">
+  <mc:AlternateContent xmlns:mc="http://schemas.openxmlformats.org/markup-compatibility/2006" xmlns:p14="http://schemas.microsoft.com/office/powerpoint/2010/main">
+    <mc:Choice Requires="p14">
       <p:transition spd="med" p14:dur="700">
         <p:fade/>
       </p:transition>
     </mc:Choice>
-    <mc:Fallback>
+    <mc:Fallback xmlns="">
       <p:transition spd="med">
         <p:fade/>
       </p:transition>
@@ -8230,13 +8111,13 @@
   <p:clrMapOvr>
     <a:masterClrMapping/>
   </p:clrMapOvr>
-  <mc:AlternateContent xmlns:mc="http://schemas.openxmlformats.org/markup-compatibility/2006">
-    <mc:Choice xmlns:p14="http://schemas.microsoft.com/office/powerpoint/2010/main" Requires="p14">
+  <mc:AlternateContent xmlns:mc="http://schemas.openxmlformats.org/markup-compatibility/2006" xmlns:p14="http://schemas.microsoft.com/office/powerpoint/2010/main">
+    <mc:Choice Requires="p14">
       <p:transition spd="med" p14:dur="700">
         <p:fade/>
       </p:transition>
     </mc:Choice>
-    <mc:Fallback>
+    <mc:Fallback xmlns="">
       <p:transition spd="med">
         <p:fade/>
       </p:transition>
@@ -8378,13 +8259,13 @@
   <p:clrMapOvr>
     <a:masterClrMapping/>
   </p:clrMapOvr>
-  <mc:AlternateContent xmlns:mc="http://schemas.openxmlformats.org/markup-compatibility/2006">
-    <mc:Choice xmlns:p14="http://schemas.microsoft.com/office/powerpoint/2010/main" Requires="p14">
+  <mc:AlternateContent xmlns:mc="http://schemas.openxmlformats.org/markup-compatibility/2006" xmlns:p14="http://schemas.microsoft.com/office/powerpoint/2010/main">
+    <mc:Choice Requires="p14">
       <p:transition spd="med" p14:dur="700">
         <p:fade/>
       </p:transition>
     </mc:Choice>
-    <mc:Fallback>
+    <mc:Fallback xmlns="">
       <p:transition spd="med">
         <p:fade/>
       </p:transition>
@@ -8882,13 +8763,13 @@
   <p:clrMapOvr>
     <a:masterClrMapping/>
   </p:clrMapOvr>
-  <mc:AlternateContent xmlns:mc="http://schemas.openxmlformats.org/markup-compatibility/2006">
-    <mc:Choice xmlns:p14="http://schemas.microsoft.com/office/powerpoint/2010/main" Requires="p14">
+  <mc:AlternateContent xmlns:mc="http://schemas.openxmlformats.org/markup-compatibility/2006" xmlns:p14="http://schemas.microsoft.com/office/powerpoint/2010/main">
+    <mc:Choice Requires="p14">
       <p:transition spd="med" p14:dur="700">
         <p:fade/>
       </p:transition>
     </mc:Choice>
-    <mc:Fallback>
+    <mc:Fallback xmlns="">
       <p:transition spd="med">
         <p:fade/>
       </p:transition>
@@ -9341,13 +9222,13 @@
   <p:clrMapOvr>
     <a:masterClrMapping/>
   </p:clrMapOvr>
-  <mc:AlternateContent xmlns:mc="http://schemas.openxmlformats.org/markup-compatibility/2006">
-    <mc:Choice xmlns:p14="http://schemas.microsoft.com/office/powerpoint/2010/main" Requires="p14">
+  <mc:AlternateContent xmlns:mc="http://schemas.openxmlformats.org/markup-compatibility/2006" xmlns:p14="http://schemas.microsoft.com/office/powerpoint/2010/main">
+    <mc:Choice Requires="p14">
       <p:transition spd="med" p14:dur="700">
         <p:fade/>
       </p:transition>
     </mc:Choice>
-    <mc:Fallback>
+    <mc:Fallback xmlns="">
       <p:transition spd="med">
         <p:fade/>
       </p:transition>
@@ -9803,6 +9684,468 @@
           <p:cNvPr id="2" name="Title 1">
             <a:extLst>
               <a:ext uri="{FF2B5EF4-FFF2-40B4-BE49-F238E27FC236}">
+                <a16:creationId xmlns:a16="http://schemas.microsoft.com/office/drawing/2014/main" id="{977B8AF1-3C5A-5B40-A022-7A684DB3C5B7}"/>
+              </a:ext>
+            </a:extLst>
+          </p:cNvPr>
+          <p:cNvSpPr>
+            <a:spLocks noGrp="1"/>
+          </p:cNvSpPr>
+          <p:nvPr>
+            <p:ph type="title"/>
+          </p:nvPr>
+        </p:nvSpPr>
+        <p:spPr/>
+        <p:txBody>
+          <a:bodyPr/>
+          <a:lstStyle/>
+          <a:p>
+            <a:r>
+              <a:rPr lang="en-US" b="1" dirty="0"/>
+              <a:t>Unit testing as a feedback loop</a:t>
+            </a:r>
+          </a:p>
+        </p:txBody>
+      </p:sp>
+      <p:sp>
+        <p:nvSpPr>
+          <p:cNvPr id="3" name="Content Placeholder 2">
+            <a:extLst>
+              <a:ext uri="{FF2B5EF4-FFF2-40B4-BE49-F238E27FC236}">
+                <a16:creationId xmlns:a16="http://schemas.microsoft.com/office/drawing/2014/main" id="{62151239-2C8C-5C47-B029-8E279A296E76}"/>
+              </a:ext>
+            </a:extLst>
+          </p:cNvPr>
+          <p:cNvSpPr>
+            <a:spLocks noGrp="1"/>
+          </p:cNvSpPr>
+          <p:nvPr>
+            <p:ph idx="1"/>
+          </p:nvPr>
+        </p:nvSpPr>
+        <p:spPr/>
+        <p:txBody>
+          <a:bodyPr/>
+          <a:lstStyle/>
+          <a:p>
+            <a:r>
+              <a:rPr lang="en-US" dirty="0"/>
+              <a:t>We apply feedback loops to every level of our development. </a:t>
+            </a:r>
+          </a:p>
+          <a:p>
+            <a:r>
+              <a:rPr lang="en-US" dirty="0"/>
+              <a:t>Unit testing is an excellent feedback loop that occurs within seconds. </a:t>
+            </a:r>
+          </a:p>
+          <a:p>
+            <a:pPr lvl="1"/>
+            <a:r>
+              <a:rPr lang="en-US" dirty="0"/>
+              <a:t>Quick execution of a unit test suite provides us with update-to-date information about our codebase.</a:t>
+            </a:r>
+          </a:p>
+          <a:p>
+            <a:r>
+              <a:rPr lang="en-US" dirty="0"/>
+              <a:t>Constant testing automation (CI build) with a test suite with good test code coverage can catch regression errors during development.</a:t>
+            </a:r>
+          </a:p>
+          <a:p>
+            <a:r>
+              <a:rPr lang="en-US" dirty="0"/>
+              <a:t>Test-driven development gives us feedback on...</a:t>
+            </a:r>
+          </a:p>
+          <a:p>
+            <a:pPr lvl="1"/>
+            <a:r>
+              <a:rPr lang="en-US" dirty="0"/>
+              <a:t>Quality of the implementation (does it work)</a:t>
+            </a:r>
+          </a:p>
+          <a:p>
+            <a:pPr lvl="1"/>
+            <a:r>
+              <a:rPr lang="en-US" dirty="0"/>
+              <a:t>Quality of the code design (is it well structured)</a:t>
+            </a:r>
+          </a:p>
+          <a:p>
+            <a:endParaRPr lang="en-US" dirty="0"/>
+          </a:p>
+        </p:txBody>
+      </p:sp>
+    </p:spTree>
+    <p:extLst>
+      <p:ext uri="{BB962C8B-B14F-4D97-AF65-F5344CB8AC3E}">
+        <p14:creationId xmlns:p14="http://schemas.microsoft.com/office/powerpoint/2010/main" val="387847106"/>
+      </p:ext>
+    </p:extLst>
+  </p:cSld>
+  <p:clrMapOvr>
+    <a:masterClrMapping/>
+  </p:clrMapOvr>
+  <mc:AlternateContent xmlns:mc="http://schemas.openxmlformats.org/markup-compatibility/2006" xmlns:p14="http://schemas.microsoft.com/office/powerpoint/2010/main">
+    <mc:Choice Requires="p14">
+      <p:transition spd="med" p14:dur="700">
+        <p:fade/>
+      </p:transition>
+    </mc:Choice>
+    <mc:Fallback xmlns="">
+      <p:transition spd="med">
+        <p:fade/>
+      </p:transition>
+    </mc:Fallback>
+  </mc:AlternateContent>
+  <p:timing>
+    <p:tnLst>
+      <p:par>
+        <p:cTn id="1" dur="indefinite" restart="never" nodeType="tmRoot">
+          <p:childTnLst>
+            <p:seq concurrent="1" nextAc="seek">
+              <p:cTn id="2" dur="indefinite" nodeType="mainSeq">
+                <p:childTnLst>
+                  <p:par>
+                    <p:cTn id="3" fill="hold">
+                      <p:stCondLst>
+                        <p:cond delay="indefinite"/>
+                      </p:stCondLst>
+                      <p:childTnLst>
+                        <p:par>
+                          <p:cTn id="4" fill="hold">
+                            <p:stCondLst>
+                              <p:cond delay="0"/>
+                            </p:stCondLst>
+                            <p:childTnLst>
+                              <p:par>
+                                <p:cTn id="5" presetID="1" presetClass="entr" presetSubtype="0" fill="hold" grpId="0" nodeType="clickEffect">
+                                  <p:stCondLst>
+                                    <p:cond delay="0"/>
+                                  </p:stCondLst>
+                                  <p:childTnLst>
+                                    <p:set>
+                                      <p:cBhvr>
+                                        <p:cTn id="6" dur="1" fill="hold">
+                                          <p:stCondLst>
+                                            <p:cond delay="0"/>
+                                          </p:stCondLst>
+                                        </p:cTn>
+                                        <p:tgtEl>
+                                          <p:spTgt spid="3">
+                                            <p:txEl>
+                                              <p:pRg st="0" end="0"/>
+                                            </p:txEl>
+                                          </p:spTgt>
+                                        </p:tgtEl>
+                                        <p:attrNameLst>
+                                          <p:attrName>style.visibility</p:attrName>
+                                        </p:attrNameLst>
+                                      </p:cBhvr>
+                                      <p:to>
+                                        <p:strVal val="visible"/>
+                                      </p:to>
+                                    </p:set>
+                                  </p:childTnLst>
+                                </p:cTn>
+                              </p:par>
+                            </p:childTnLst>
+                          </p:cTn>
+                        </p:par>
+                      </p:childTnLst>
+                    </p:cTn>
+                  </p:par>
+                  <p:par>
+                    <p:cTn id="7" fill="hold">
+                      <p:stCondLst>
+                        <p:cond delay="indefinite"/>
+                      </p:stCondLst>
+                      <p:childTnLst>
+                        <p:par>
+                          <p:cTn id="8" fill="hold">
+                            <p:stCondLst>
+                              <p:cond delay="0"/>
+                            </p:stCondLst>
+                            <p:childTnLst>
+                              <p:par>
+                                <p:cTn id="9" presetID="1" presetClass="entr" presetSubtype="0" fill="hold" grpId="0" nodeType="clickEffect">
+                                  <p:stCondLst>
+                                    <p:cond delay="0"/>
+                                  </p:stCondLst>
+                                  <p:childTnLst>
+                                    <p:set>
+                                      <p:cBhvr>
+                                        <p:cTn id="10" dur="1" fill="hold">
+                                          <p:stCondLst>
+                                            <p:cond delay="0"/>
+                                          </p:stCondLst>
+                                        </p:cTn>
+                                        <p:tgtEl>
+                                          <p:spTgt spid="3">
+                                            <p:txEl>
+                                              <p:pRg st="1" end="1"/>
+                                            </p:txEl>
+                                          </p:spTgt>
+                                        </p:tgtEl>
+                                        <p:attrNameLst>
+                                          <p:attrName>style.visibility</p:attrName>
+                                        </p:attrNameLst>
+                                      </p:cBhvr>
+                                      <p:to>
+                                        <p:strVal val="visible"/>
+                                      </p:to>
+                                    </p:set>
+                                  </p:childTnLst>
+                                </p:cTn>
+                              </p:par>
+                              <p:par>
+                                <p:cTn id="11" presetID="1" presetClass="entr" presetSubtype="0" fill="hold" grpId="0" nodeType="withEffect">
+                                  <p:stCondLst>
+                                    <p:cond delay="0"/>
+                                  </p:stCondLst>
+                                  <p:childTnLst>
+                                    <p:set>
+                                      <p:cBhvr>
+                                        <p:cTn id="12" dur="1" fill="hold">
+                                          <p:stCondLst>
+                                            <p:cond delay="0"/>
+                                          </p:stCondLst>
+                                        </p:cTn>
+                                        <p:tgtEl>
+                                          <p:spTgt spid="3">
+                                            <p:txEl>
+                                              <p:pRg st="2" end="2"/>
+                                            </p:txEl>
+                                          </p:spTgt>
+                                        </p:tgtEl>
+                                        <p:attrNameLst>
+                                          <p:attrName>style.visibility</p:attrName>
+                                        </p:attrNameLst>
+                                      </p:cBhvr>
+                                      <p:to>
+                                        <p:strVal val="visible"/>
+                                      </p:to>
+                                    </p:set>
+                                  </p:childTnLst>
+                                </p:cTn>
+                              </p:par>
+                            </p:childTnLst>
+                          </p:cTn>
+                        </p:par>
+                      </p:childTnLst>
+                    </p:cTn>
+                  </p:par>
+                  <p:par>
+                    <p:cTn id="13" fill="hold">
+                      <p:stCondLst>
+                        <p:cond delay="indefinite"/>
+                      </p:stCondLst>
+                      <p:childTnLst>
+                        <p:par>
+                          <p:cTn id="14" fill="hold">
+                            <p:stCondLst>
+                              <p:cond delay="0"/>
+                            </p:stCondLst>
+                            <p:childTnLst>
+                              <p:par>
+                                <p:cTn id="15" presetID="1" presetClass="entr" presetSubtype="0" fill="hold" grpId="0" nodeType="clickEffect">
+                                  <p:stCondLst>
+                                    <p:cond delay="0"/>
+                                  </p:stCondLst>
+                                  <p:childTnLst>
+                                    <p:set>
+                                      <p:cBhvr>
+                                        <p:cTn id="16" dur="1" fill="hold">
+                                          <p:stCondLst>
+                                            <p:cond delay="0"/>
+                                          </p:stCondLst>
+                                        </p:cTn>
+                                        <p:tgtEl>
+                                          <p:spTgt spid="3">
+                                            <p:txEl>
+                                              <p:pRg st="3" end="3"/>
+                                            </p:txEl>
+                                          </p:spTgt>
+                                        </p:tgtEl>
+                                        <p:attrNameLst>
+                                          <p:attrName>style.visibility</p:attrName>
+                                        </p:attrNameLst>
+                                      </p:cBhvr>
+                                      <p:to>
+                                        <p:strVal val="visible"/>
+                                      </p:to>
+                                    </p:set>
+                                  </p:childTnLst>
+                                </p:cTn>
+                              </p:par>
+                            </p:childTnLst>
+                          </p:cTn>
+                        </p:par>
+                      </p:childTnLst>
+                    </p:cTn>
+                  </p:par>
+                  <p:par>
+                    <p:cTn id="17" fill="hold">
+                      <p:stCondLst>
+                        <p:cond delay="indefinite"/>
+                      </p:stCondLst>
+                      <p:childTnLst>
+                        <p:par>
+                          <p:cTn id="18" fill="hold">
+                            <p:stCondLst>
+                              <p:cond delay="0"/>
+                            </p:stCondLst>
+                            <p:childTnLst>
+                              <p:par>
+                                <p:cTn id="19" presetID="1" presetClass="entr" presetSubtype="0" fill="hold" grpId="0" nodeType="clickEffect">
+                                  <p:stCondLst>
+                                    <p:cond delay="0"/>
+                                  </p:stCondLst>
+                                  <p:childTnLst>
+                                    <p:set>
+                                      <p:cBhvr>
+                                        <p:cTn id="20" dur="1" fill="hold">
+                                          <p:stCondLst>
+                                            <p:cond delay="0"/>
+                                          </p:stCondLst>
+                                        </p:cTn>
+                                        <p:tgtEl>
+                                          <p:spTgt spid="3">
+                                            <p:txEl>
+                                              <p:pRg st="4" end="4"/>
+                                            </p:txEl>
+                                          </p:spTgt>
+                                        </p:tgtEl>
+                                        <p:attrNameLst>
+                                          <p:attrName>style.visibility</p:attrName>
+                                        </p:attrNameLst>
+                                      </p:cBhvr>
+                                      <p:to>
+                                        <p:strVal val="visible"/>
+                                      </p:to>
+                                    </p:set>
+                                  </p:childTnLst>
+                                </p:cTn>
+                              </p:par>
+                              <p:par>
+                                <p:cTn id="21" presetID="1" presetClass="entr" presetSubtype="0" fill="hold" grpId="0" nodeType="withEffect">
+                                  <p:stCondLst>
+                                    <p:cond delay="0"/>
+                                  </p:stCondLst>
+                                  <p:childTnLst>
+                                    <p:set>
+                                      <p:cBhvr>
+                                        <p:cTn id="22" dur="1" fill="hold">
+                                          <p:stCondLst>
+                                            <p:cond delay="0"/>
+                                          </p:stCondLst>
+                                        </p:cTn>
+                                        <p:tgtEl>
+                                          <p:spTgt spid="3">
+                                            <p:txEl>
+                                              <p:pRg st="5" end="5"/>
+                                            </p:txEl>
+                                          </p:spTgt>
+                                        </p:tgtEl>
+                                        <p:attrNameLst>
+                                          <p:attrName>style.visibility</p:attrName>
+                                        </p:attrNameLst>
+                                      </p:cBhvr>
+                                      <p:to>
+                                        <p:strVal val="visible"/>
+                                      </p:to>
+                                    </p:set>
+                                  </p:childTnLst>
+                                </p:cTn>
+                              </p:par>
+                              <p:par>
+                                <p:cTn id="23" presetID="1" presetClass="entr" presetSubtype="0" fill="hold" grpId="0" nodeType="withEffect">
+                                  <p:stCondLst>
+                                    <p:cond delay="0"/>
+                                  </p:stCondLst>
+                                  <p:childTnLst>
+                                    <p:set>
+                                      <p:cBhvr>
+                                        <p:cTn id="24" dur="1" fill="hold">
+                                          <p:stCondLst>
+                                            <p:cond delay="0"/>
+                                          </p:stCondLst>
+                                        </p:cTn>
+                                        <p:tgtEl>
+                                          <p:spTgt spid="3">
+                                            <p:txEl>
+                                              <p:pRg st="6" end="6"/>
+                                            </p:txEl>
+                                          </p:spTgt>
+                                        </p:tgtEl>
+                                        <p:attrNameLst>
+                                          <p:attrName>style.visibility</p:attrName>
+                                        </p:attrNameLst>
+                                      </p:cBhvr>
+                                      <p:to>
+                                        <p:strVal val="visible"/>
+                                      </p:to>
+                                    </p:set>
+                                  </p:childTnLst>
+                                </p:cTn>
+                              </p:par>
+                            </p:childTnLst>
+                          </p:cTn>
+                        </p:par>
+                      </p:childTnLst>
+                    </p:cTn>
+                  </p:par>
+                </p:childTnLst>
+              </p:cTn>
+              <p:prevCondLst>
+                <p:cond evt="onPrev" delay="0">
+                  <p:tgtEl>
+                    <p:sldTgt/>
+                  </p:tgtEl>
+                </p:cond>
+              </p:prevCondLst>
+              <p:nextCondLst>
+                <p:cond evt="onNext" delay="0">
+                  <p:tgtEl>
+                    <p:sldTgt/>
+                  </p:tgtEl>
+                </p:cond>
+              </p:nextCondLst>
+            </p:seq>
+          </p:childTnLst>
+        </p:cTn>
+      </p:par>
+    </p:tnLst>
+    <p:bldLst>
+      <p:bldP spid="3" grpId="0" build="p"/>
+    </p:bldLst>
+  </p:timing>
+</p:sld>
+</file>
+
+<file path=ppt/slides/slide7.xml><?xml version="1.0" encoding="utf-8"?>
+<p:sld xmlns:a="http://schemas.openxmlformats.org/drawingml/2006/main" xmlns:r="http://schemas.openxmlformats.org/officeDocument/2006/relationships" xmlns:p="http://schemas.openxmlformats.org/presentationml/2006/main">
+  <p:cSld>
+    <p:spTree>
+      <p:nvGrpSpPr>
+        <p:cNvPr id="1" name=""/>
+        <p:cNvGrpSpPr/>
+        <p:nvPr/>
+      </p:nvGrpSpPr>
+      <p:grpSpPr>
+        <a:xfrm>
+          <a:off x="0" y="0"/>
+          <a:ext cx="0" cy="0"/>
+          <a:chOff x="0" y="0"/>
+          <a:chExt cx="0" cy="0"/>
+        </a:xfrm>
+      </p:grpSpPr>
+      <p:sp>
+        <p:nvSpPr>
+          <p:cNvPr id="2" name="Title 1">
+            <a:extLst>
+              <a:ext uri="{FF2B5EF4-FFF2-40B4-BE49-F238E27FC236}">
                 <a16:creationId xmlns:a16="http://schemas.microsoft.com/office/drawing/2014/main" id="{BABD1CAC-6277-124D-AB33-8288E45C6348}"/>
               </a:ext>
             </a:extLst>
@@ -9898,13 +10241,13 @@
   <p:clrMapOvr>
     <a:masterClrMapping/>
   </p:clrMapOvr>
-  <mc:AlternateContent xmlns:mc="http://schemas.openxmlformats.org/markup-compatibility/2006">
-    <mc:Choice xmlns:p14="http://schemas.microsoft.com/office/powerpoint/2010/main" Requires="p14">
+  <mc:AlternateContent xmlns:mc="http://schemas.openxmlformats.org/markup-compatibility/2006" xmlns:p14="http://schemas.microsoft.com/office/powerpoint/2010/main">
+    <mc:Choice Requires="p14">
       <p:transition spd="med" p14:dur="700">
         <p:fade/>
       </p:transition>
     </mc:Choice>
-    <mc:Fallback>
+    <mc:Fallback xmlns="">
       <p:transition spd="med">
         <p:fade/>
       </p:transition>
@@ -10168,7 +10511,7 @@
 </p:sld>
 </file>
 
-<file path=ppt/slides/slide7.xml><?xml version="1.0" encoding="utf-8"?>
+<file path=ppt/slides/slide8.xml><?xml version="1.0" encoding="utf-8"?>
 <p:sld xmlns:a="http://schemas.openxmlformats.org/drawingml/2006/main" xmlns:r="http://schemas.openxmlformats.org/officeDocument/2006/relationships" xmlns:p="http://schemas.openxmlformats.org/presentationml/2006/main">
   <p:cSld>
     <p:spTree>
@@ -10292,13 +10635,13 @@
   <p:clrMapOvr>
     <a:masterClrMapping/>
   </p:clrMapOvr>
-  <mc:AlternateContent xmlns:mc="http://schemas.openxmlformats.org/markup-compatibility/2006">
-    <mc:Choice xmlns:p14="http://schemas.microsoft.com/office/powerpoint/2010/main" Requires="p14">
+  <mc:AlternateContent xmlns:mc="http://schemas.openxmlformats.org/markup-compatibility/2006" xmlns:p14="http://schemas.microsoft.com/office/powerpoint/2010/main">
+    <mc:Choice Requires="p14">
       <p:transition spd="med" p14:dur="700">
         <p:fade/>
       </p:transition>
     </mc:Choice>
-    <mc:Fallback>
+    <mc:Fallback xmlns="">
       <p:transition spd="med">
         <p:fade/>
       </p:transition>
@@ -10593,7 +10936,7 @@
 </p:sld>
 </file>
 
-<file path=ppt/slides/slide8.xml><?xml version="1.0" encoding="utf-8"?>
+<file path=ppt/slides/slide9.xml><?xml version="1.0" encoding="utf-8"?>
 <p:sld xmlns:a="http://schemas.openxmlformats.org/drawingml/2006/main" xmlns:r="http://schemas.openxmlformats.org/officeDocument/2006/relationships" xmlns:p="http://schemas.openxmlformats.org/presentationml/2006/main">
   <p:cSld>
     <p:spTree>
@@ -10721,13 +11064,13 @@
   <p:clrMapOvr>
     <a:masterClrMapping/>
   </p:clrMapOvr>
-  <mc:AlternateContent xmlns:mc="http://schemas.openxmlformats.org/markup-compatibility/2006">
-    <mc:Choice xmlns:p14="http://schemas.microsoft.com/office/powerpoint/2010/main" Requires="p14">
+  <mc:AlternateContent xmlns:mc="http://schemas.openxmlformats.org/markup-compatibility/2006" xmlns:p14="http://schemas.microsoft.com/office/powerpoint/2010/main">
+    <mc:Choice Requires="p14">
       <p:transition spd="med" p14:dur="700">
         <p:fade/>
       </p:transition>
     </mc:Choice>
-    <mc:Fallback>
+    <mc:Fallback xmlns="">
       <p:transition spd="med">
         <p:fade/>
       </p:transition>
@@ -11046,353 +11389,6 @@
                                           <p:spTgt spid="3">
                                             <p:txEl>
                                               <p:pRg st="6" end="6"/>
-                                            </p:txEl>
-                                          </p:spTgt>
-                                        </p:tgtEl>
-                                        <p:attrNameLst>
-                                          <p:attrName>style.visibility</p:attrName>
-                                        </p:attrNameLst>
-                                      </p:cBhvr>
-                                      <p:to>
-                                        <p:strVal val="visible"/>
-                                      </p:to>
-                                    </p:set>
-                                  </p:childTnLst>
-                                </p:cTn>
-                              </p:par>
-                            </p:childTnLst>
-                          </p:cTn>
-                        </p:par>
-                      </p:childTnLst>
-                    </p:cTn>
-                  </p:par>
-                </p:childTnLst>
-              </p:cTn>
-              <p:prevCondLst>
-                <p:cond evt="onPrev" delay="0">
-                  <p:tgtEl>
-                    <p:sldTgt/>
-                  </p:tgtEl>
-                </p:cond>
-              </p:prevCondLst>
-              <p:nextCondLst>
-                <p:cond evt="onNext" delay="0">
-                  <p:tgtEl>
-                    <p:sldTgt/>
-                  </p:tgtEl>
-                </p:cond>
-              </p:nextCondLst>
-            </p:seq>
-          </p:childTnLst>
-        </p:cTn>
-      </p:par>
-    </p:tnLst>
-    <p:bldLst>
-      <p:bldP spid="3" grpId="0" build="p"/>
-    </p:bldLst>
-  </p:timing>
-</p:sld>
-</file>
-
-<file path=ppt/slides/slide9.xml><?xml version="1.0" encoding="utf-8"?>
-<p:sld xmlns:a="http://schemas.openxmlformats.org/drawingml/2006/main" xmlns:r="http://schemas.openxmlformats.org/officeDocument/2006/relationships" xmlns:p="http://schemas.openxmlformats.org/presentationml/2006/main">
-  <p:cSld>
-    <p:spTree>
-      <p:nvGrpSpPr>
-        <p:cNvPr id="1" name=""/>
-        <p:cNvGrpSpPr/>
-        <p:nvPr/>
-      </p:nvGrpSpPr>
-      <p:grpSpPr>
-        <a:xfrm>
-          <a:off x="0" y="0"/>
-          <a:ext cx="0" cy="0"/>
-          <a:chOff x="0" y="0"/>
-          <a:chExt cx="0" cy="0"/>
-        </a:xfrm>
-      </p:grpSpPr>
-      <p:sp>
-        <p:nvSpPr>
-          <p:cNvPr id="2" name="Title 1">
-            <a:extLst>
-              <a:ext uri="{FF2B5EF4-FFF2-40B4-BE49-F238E27FC236}">
-                <a16:creationId xmlns:a16="http://schemas.microsoft.com/office/drawing/2014/main" id="{B557B37C-020B-E749-B234-CB1BC31B0CD1}"/>
-              </a:ext>
-            </a:extLst>
-          </p:cNvPr>
-          <p:cNvSpPr>
-            <a:spLocks noGrp="1"/>
-          </p:cNvSpPr>
-          <p:nvPr>
-            <p:ph type="title"/>
-          </p:nvPr>
-        </p:nvSpPr>
-        <p:spPr/>
-        <p:txBody>
-          <a:bodyPr/>
-          <a:lstStyle/>
-          <a:p>
-            <a:r>
-              <a:rPr lang="en-US" b="1" dirty="0"/>
-              <a:t>Accidental vs. essential complexity</a:t>
-            </a:r>
-          </a:p>
-        </p:txBody>
-      </p:sp>
-      <p:sp>
-        <p:nvSpPr>
-          <p:cNvPr id="3" name="Content Placeholder 2">
-            <a:extLst>
-              <a:ext uri="{FF2B5EF4-FFF2-40B4-BE49-F238E27FC236}">
-                <a16:creationId xmlns:a16="http://schemas.microsoft.com/office/drawing/2014/main" id="{CB381E5E-0FAF-D144-B905-6A8F86A608AE}"/>
-              </a:ext>
-            </a:extLst>
-          </p:cNvPr>
-          <p:cNvSpPr>
-            <a:spLocks noGrp="1"/>
-          </p:cNvSpPr>
-          <p:nvPr>
-            <p:ph idx="1"/>
-          </p:nvPr>
-        </p:nvSpPr>
-        <p:spPr/>
-        <p:txBody>
-          <a:bodyPr>
-            <a:normAutofit/>
-          </a:bodyPr>
-          <a:lstStyle/>
-          <a:p>
-            <a:r>
-              <a:rPr lang="en-US" dirty="0"/>
-              <a:t>Software should behave predictably and accomplish its goals without too many surprises (that is, outages in production). </a:t>
-            </a:r>
-          </a:p>
-          <a:p>
-            <a:r>
-              <a:rPr lang="en-US" dirty="0"/>
-              <a:t>The number of surprises directly correlates with the amount of unnecessary complexity found in a project.</a:t>
-            </a:r>
-          </a:p>
-          <a:p>
-            <a:r>
-              <a:rPr lang="en-US" i="1" dirty="0"/>
-              <a:t>Accidental complexity relates to problems which engineers create and can fix, [whereas] essential complexity is caused by the problem to be solved, and nothing can remove it – Fred Brooks in his seminal “No Silver Bullet” essay</a:t>
-            </a:r>
-          </a:p>
-          <a:p>
-            <a:r>
-              <a:rPr lang="en-US" dirty="0"/>
-              <a:t>Push back when accidental complexity is introduced. </a:t>
-            </a:r>
-          </a:p>
-        </p:txBody>
-      </p:sp>
-    </p:spTree>
-    <p:extLst>
-      <p:ext uri="{BB962C8B-B14F-4D97-AF65-F5344CB8AC3E}">
-        <p14:creationId xmlns:p14="http://schemas.microsoft.com/office/powerpoint/2010/main" val="210959948"/>
-      </p:ext>
-    </p:extLst>
-  </p:cSld>
-  <p:clrMapOvr>
-    <a:masterClrMapping/>
-  </p:clrMapOvr>
-  <mc:AlternateContent xmlns:mc="http://schemas.openxmlformats.org/markup-compatibility/2006">
-    <mc:Choice xmlns:p14="http://schemas.microsoft.com/office/powerpoint/2010/main" Requires="p14">
-      <p:transition spd="med" p14:dur="700">
-        <p:fade/>
-      </p:transition>
-    </mc:Choice>
-    <mc:Fallback>
-      <p:transition spd="med">
-        <p:fade/>
-      </p:transition>
-    </mc:Fallback>
-  </mc:AlternateContent>
-  <p:timing>
-    <p:tnLst>
-      <p:par>
-        <p:cTn id="1" dur="indefinite" restart="never" nodeType="tmRoot">
-          <p:childTnLst>
-            <p:seq concurrent="1" nextAc="seek">
-              <p:cTn id="2" dur="indefinite" nodeType="mainSeq">
-                <p:childTnLst>
-                  <p:par>
-                    <p:cTn id="3" fill="hold">
-                      <p:stCondLst>
-                        <p:cond delay="indefinite"/>
-                      </p:stCondLst>
-                      <p:childTnLst>
-                        <p:par>
-                          <p:cTn id="4" fill="hold">
-                            <p:stCondLst>
-                              <p:cond delay="0"/>
-                            </p:stCondLst>
-                            <p:childTnLst>
-                              <p:par>
-                                <p:cTn id="5" presetID="1" presetClass="entr" presetSubtype="0" fill="hold" grpId="0" nodeType="clickEffect">
-                                  <p:stCondLst>
-                                    <p:cond delay="0"/>
-                                  </p:stCondLst>
-                                  <p:childTnLst>
-                                    <p:set>
-                                      <p:cBhvr>
-                                        <p:cTn id="6" dur="1" fill="hold">
-                                          <p:stCondLst>
-                                            <p:cond delay="0"/>
-                                          </p:stCondLst>
-                                        </p:cTn>
-                                        <p:tgtEl>
-                                          <p:spTgt spid="3">
-                                            <p:txEl>
-                                              <p:pRg st="0" end="0"/>
-                                            </p:txEl>
-                                          </p:spTgt>
-                                        </p:tgtEl>
-                                        <p:attrNameLst>
-                                          <p:attrName>style.visibility</p:attrName>
-                                        </p:attrNameLst>
-                                      </p:cBhvr>
-                                      <p:to>
-                                        <p:strVal val="visible"/>
-                                      </p:to>
-                                    </p:set>
-                                  </p:childTnLst>
-                                </p:cTn>
-                              </p:par>
-                            </p:childTnLst>
-                          </p:cTn>
-                        </p:par>
-                      </p:childTnLst>
-                    </p:cTn>
-                  </p:par>
-                  <p:par>
-                    <p:cTn id="7" fill="hold">
-                      <p:stCondLst>
-                        <p:cond delay="indefinite"/>
-                      </p:stCondLst>
-                      <p:childTnLst>
-                        <p:par>
-                          <p:cTn id="8" fill="hold">
-                            <p:stCondLst>
-                              <p:cond delay="0"/>
-                            </p:stCondLst>
-                            <p:childTnLst>
-                              <p:par>
-                                <p:cTn id="9" presetID="1" presetClass="entr" presetSubtype="0" fill="hold" grpId="0" nodeType="clickEffect">
-                                  <p:stCondLst>
-                                    <p:cond delay="0"/>
-                                  </p:stCondLst>
-                                  <p:childTnLst>
-                                    <p:set>
-                                      <p:cBhvr>
-                                        <p:cTn id="10" dur="1" fill="hold">
-                                          <p:stCondLst>
-                                            <p:cond delay="0"/>
-                                          </p:stCondLst>
-                                        </p:cTn>
-                                        <p:tgtEl>
-                                          <p:spTgt spid="3">
-                                            <p:txEl>
-                                              <p:pRg st="1" end="1"/>
-                                            </p:txEl>
-                                          </p:spTgt>
-                                        </p:tgtEl>
-                                        <p:attrNameLst>
-                                          <p:attrName>style.visibility</p:attrName>
-                                        </p:attrNameLst>
-                                      </p:cBhvr>
-                                      <p:to>
-                                        <p:strVal val="visible"/>
-                                      </p:to>
-                                    </p:set>
-                                  </p:childTnLst>
-                                </p:cTn>
-                              </p:par>
-                            </p:childTnLst>
-                          </p:cTn>
-                        </p:par>
-                      </p:childTnLst>
-                    </p:cTn>
-                  </p:par>
-                  <p:par>
-                    <p:cTn id="11" fill="hold">
-                      <p:stCondLst>
-                        <p:cond delay="indefinite"/>
-                      </p:stCondLst>
-                      <p:childTnLst>
-                        <p:par>
-                          <p:cTn id="12" fill="hold">
-                            <p:stCondLst>
-                              <p:cond delay="0"/>
-                            </p:stCondLst>
-                            <p:childTnLst>
-                              <p:par>
-                                <p:cTn id="13" presetID="1" presetClass="entr" presetSubtype="0" fill="hold" grpId="0" nodeType="clickEffect">
-                                  <p:stCondLst>
-                                    <p:cond delay="0"/>
-                                  </p:stCondLst>
-                                  <p:childTnLst>
-                                    <p:set>
-                                      <p:cBhvr>
-                                        <p:cTn id="14" dur="1" fill="hold">
-                                          <p:stCondLst>
-                                            <p:cond delay="0"/>
-                                          </p:stCondLst>
-                                        </p:cTn>
-                                        <p:tgtEl>
-                                          <p:spTgt spid="3">
-                                            <p:txEl>
-                                              <p:pRg st="2" end="2"/>
-                                            </p:txEl>
-                                          </p:spTgt>
-                                        </p:tgtEl>
-                                        <p:attrNameLst>
-                                          <p:attrName>style.visibility</p:attrName>
-                                        </p:attrNameLst>
-                                      </p:cBhvr>
-                                      <p:to>
-                                        <p:strVal val="visible"/>
-                                      </p:to>
-                                    </p:set>
-                                  </p:childTnLst>
-                                </p:cTn>
-                              </p:par>
-                            </p:childTnLst>
-                          </p:cTn>
-                        </p:par>
-                      </p:childTnLst>
-                    </p:cTn>
-                  </p:par>
-                  <p:par>
-                    <p:cTn id="15" fill="hold">
-                      <p:stCondLst>
-                        <p:cond delay="indefinite"/>
-                      </p:stCondLst>
-                      <p:childTnLst>
-                        <p:par>
-                          <p:cTn id="16" fill="hold">
-                            <p:stCondLst>
-                              <p:cond delay="0"/>
-                            </p:stCondLst>
-                            <p:childTnLst>
-                              <p:par>
-                                <p:cTn id="17" presetID="1" presetClass="entr" presetSubtype="0" fill="hold" grpId="0" nodeType="clickEffect">
-                                  <p:stCondLst>
-                                    <p:cond delay="0"/>
-                                  </p:stCondLst>
-                                  <p:childTnLst>
-                                    <p:set>
-                                      <p:cBhvr>
-                                        <p:cTn id="18" dur="1" fill="hold">
-                                          <p:stCondLst>
-                                            <p:cond delay="0"/>
-                                          </p:stCondLst>
-                                        </p:cTn>
-                                        <p:tgtEl>
-                                          <p:spTgt spid="3">
-                                            <p:txEl>
-                                              <p:pRg st="3" end="3"/>
                                             </p:txEl>
                                           </p:spTgt>
                                         </p:tgtEl>

</xml_diff>